<commit_message>
update on 2014/03/31 - 7:56:23.50
</commit_message>
<xml_diff>
--- a/version1.0/document/股票分析系统.pptx
+++ b/version1.0/document/股票分析系统.pptx
@@ -290,7 +290,7 @@
             <a:fld id="{530820CF-B880-4189-942D-D702A7CBA730}" type="datetimeFigureOut">
               <a:rPr lang="zh-CN" altLang="en-US" smtClean="0"/>
               <a:pPr/>
-              <a:t>2014/3/29</a:t>
+              <a:t>2014/3/31</a:t>
             </a:fld>
             <a:endParaRPr lang="zh-CN" altLang="en-US"/>
           </a:p>
@@ -457,7 +457,7 @@
             <a:fld id="{530820CF-B880-4189-942D-D702A7CBA730}" type="datetimeFigureOut">
               <a:rPr lang="zh-CN" altLang="en-US" smtClean="0"/>
               <a:pPr/>
-              <a:t>2014/3/29</a:t>
+              <a:t>2014/3/31</a:t>
             </a:fld>
             <a:endParaRPr lang="zh-CN" altLang="en-US"/>
           </a:p>
@@ -634,7 +634,7 @@
             <a:fld id="{530820CF-B880-4189-942D-D702A7CBA730}" type="datetimeFigureOut">
               <a:rPr lang="zh-CN" altLang="en-US" smtClean="0"/>
               <a:pPr/>
-              <a:t>2014/3/29</a:t>
+              <a:t>2014/3/31</a:t>
             </a:fld>
             <a:endParaRPr lang="zh-CN" altLang="en-US"/>
           </a:p>
@@ -801,7 +801,7 @@
             <a:fld id="{530820CF-B880-4189-942D-D702A7CBA730}" type="datetimeFigureOut">
               <a:rPr lang="zh-CN" altLang="en-US" smtClean="0"/>
               <a:pPr/>
-              <a:t>2014/3/29</a:t>
+              <a:t>2014/3/31</a:t>
             </a:fld>
             <a:endParaRPr lang="zh-CN" altLang="en-US"/>
           </a:p>
@@ -1045,7 +1045,7 @@
             <a:fld id="{530820CF-B880-4189-942D-D702A7CBA730}" type="datetimeFigureOut">
               <a:rPr lang="zh-CN" altLang="en-US" smtClean="0"/>
               <a:pPr/>
-              <a:t>2014/3/29</a:t>
+              <a:t>2014/3/31</a:t>
             </a:fld>
             <a:endParaRPr lang="zh-CN" altLang="en-US"/>
           </a:p>
@@ -1311,7 +1311,7 @@
             <a:fld id="{530820CF-B880-4189-942D-D702A7CBA730}" type="datetimeFigureOut">
               <a:rPr lang="zh-CN" altLang="en-US" smtClean="0"/>
               <a:pPr/>
-              <a:t>2014/3/29</a:t>
+              <a:t>2014/3/31</a:t>
             </a:fld>
             <a:endParaRPr lang="zh-CN" altLang="en-US"/>
           </a:p>
@@ -1691,7 +1691,7 @@
             <a:fld id="{530820CF-B880-4189-942D-D702A7CBA730}" type="datetimeFigureOut">
               <a:rPr lang="zh-CN" altLang="en-US" smtClean="0"/>
               <a:pPr/>
-              <a:t>2014/3/29</a:t>
+              <a:t>2014/3/31</a:t>
             </a:fld>
             <a:endParaRPr lang="zh-CN" altLang="en-US"/>
           </a:p>
@@ -1843,7 +1843,7 @@
             <a:fld id="{530820CF-B880-4189-942D-D702A7CBA730}" type="datetimeFigureOut">
               <a:rPr lang="zh-CN" altLang="en-US" smtClean="0"/>
               <a:pPr/>
-              <a:t>2014/3/29</a:t>
+              <a:t>2014/3/31</a:t>
             </a:fld>
             <a:endParaRPr lang="zh-CN" altLang="en-US"/>
           </a:p>
@@ -1935,7 +1935,7 @@
             <a:fld id="{530820CF-B880-4189-942D-D702A7CBA730}" type="datetimeFigureOut">
               <a:rPr lang="zh-CN" altLang="en-US" smtClean="0"/>
               <a:pPr/>
-              <a:t>2014/3/29</a:t>
+              <a:t>2014/3/31</a:t>
             </a:fld>
             <a:endParaRPr lang="zh-CN" altLang="en-US"/>
           </a:p>
@@ -2198,7 +2198,7 @@
             <a:fld id="{530820CF-B880-4189-942D-D702A7CBA730}" type="datetimeFigureOut">
               <a:rPr lang="zh-CN" altLang="en-US" smtClean="0"/>
               <a:pPr/>
-              <a:t>2014/3/29</a:t>
+              <a:t>2014/3/31</a:t>
             </a:fld>
             <a:endParaRPr lang="zh-CN" altLang="en-US"/>
           </a:p>
@@ -2488,7 +2488,7 @@
             <a:fld id="{530820CF-B880-4189-942D-D702A7CBA730}" type="datetimeFigureOut">
               <a:rPr lang="zh-CN" altLang="en-US" smtClean="0"/>
               <a:pPr/>
-              <a:t>2014/3/29</a:t>
+              <a:t>2014/3/31</a:t>
             </a:fld>
             <a:endParaRPr lang="zh-CN" altLang="en-US"/>
           </a:p>
@@ -3261,7 +3261,7 @@
             <a:fld id="{530820CF-B880-4189-942D-D702A7CBA730}" type="datetimeFigureOut">
               <a:rPr lang="zh-CN" altLang="en-US" smtClean="0"/>
               <a:pPr/>
-              <a:t>2014/3/29</a:t>
+              <a:t>2014/3/31</a:t>
             </a:fld>
             <a:endParaRPr lang="zh-CN" altLang="en-US"/>
           </a:p>
@@ -3897,11 +3897,7 @@
           <a:p>
             <a:r>
               <a:rPr lang="zh-CN" altLang="en-US" dirty="0" smtClean="0"/>
-              <a:t>股</a:t>
-            </a:r>
-            <a:r>
-              <a:rPr lang="zh-CN" altLang="en-US" dirty="0" smtClean="0"/>
-              <a:t>票预测系统</a:t>
+              <a:t>股票预测系统</a:t>
             </a:r>
             <a:endParaRPr lang="zh-CN" altLang="en-US" dirty="0"/>
           </a:p>
@@ -4182,11 +4178,7 @@
             <a:pPr algn="ctr"/>
             <a:r>
               <a:rPr lang="zh-CN" altLang="en-US" dirty="0" smtClean="0"/>
-              <a:t>实盘</a:t>
-            </a:r>
-            <a:r>
-              <a:rPr lang="zh-CN" altLang="en-US" dirty="0" smtClean="0"/>
-              <a:t>买卖报告</a:t>
+              <a:t>实盘买卖报告</a:t>
             </a:r>
             <a:endParaRPr lang="zh-CN" altLang="en-US" dirty="0"/>
           </a:p>
@@ -4234,11 +4226,7 @@
           <a:p>
             <a:r>
               <a:rPr lang="zh-CN" altLang="en-US" dirty="0" smtClean="0"/>
-              <a:t>总体架</a:t>
-            </a:r>
-            <a:r>
-              <a:rPr lang="zh-CN" altLang="en-US" dirty="0" smtClean="0"/>
-              <a:t>构</a:t>
+              <a:t>总体架构</a:t>
             </a:r>
             <a:endParaRPr lang="zh-CN" altLang="en-US" dirty="0"/>
           </a:p>
@@ -4697,7 +4685,7 @@
         </p:nvSpPr>
         <p:spPr>
           <a:xfrm>
-            <a:off x="827584" y="3789040"/>
+            <a:off x="3563888" y="3501008"/>
             <a:ext cx="2520280" cy="936104"/>
           </a:xfrm>
           <a:prstGeom prst="ellipse">
@@ -4745,8 +4733,8 @@
         </p:nvSpPr>
         <p:spPr>
           <a:xfrm>
-            <a:off x="3923928" y="3645024"/>
-            <a:ext cx="1656184" cy="1584176"/>
+            <a:off x="3923928" y="4581128"/>
+            <a:ext cx="1800200" cy="1584176"/>
           </a:xfrm>
           <a:prstGeom prst="can">
             <a:avLst/>
@@ -4789,8 +4777,8 @@
         </p:nvSpPr>
         <p:spPr>
           <a:xfrm>
-            <a:off x="6444208" y="3645024"/>
-            <a:ext cx="2088232" cy="1080120"/>
+            <a:off x="3563888" y="2204864"/>
+            <a:ext cx="2448272" cy="1080120"/>
           </a:xfrm>
           <a:prstGeom prst="ellipse">
             <a:avLst/>
@@ -4827,16 +4815,16 @@
       </p:sp>
       <p:sp>
         <p:nvSpPr>
-          <p:cNvPr id="8" name="椭圆 7"/>
+          <p:cNvPr id="9" name="矩形 8"/>
           <p:cNvSpPr/>
           <p:nvPr/>
         </p:nvSpPr>
         <p:spPr>
           <a:xfrm>
-            <a:off x="3347864" y="2060848"/>
-            <a:ext cx="2592288" cy="1080120"/>
-          </a:xfrm>
-          <a:prstGeom prst="ellipse">
+            <a:off x="2699792" y="2060848"/>
+            <a:ext cx="720080" cy="4104456"/>
+          </a:xfrm>
+          <a:prstGeom prst="rect">
             <a:avLst/>
           </a:prstGeom>
         </p:spPr>
@@ -4869,6 +4857,85 @@
           </a:p>
         </p:txBody>
       </p:sp>
+      <p:sp>
+        <p:nvSpPr>
+          <p:cNvPr id="10" name="流程图: 磁盘 9"/>
+          <p:cNvSpPr/>
+          <p:nvPr/>
+        </p:nvSpPr>
+        <p:spPr>
+          <a:xfrm>
+            <a:off x="6948264" y="2132856"/>
+            <a:ext cx="1152128" cy="1152128"/>
+          </a:xfrm>
+          <a:prstGeom prst="flowChartMagneticDisk">
+            <a:avLst/>
+          </a:prstGeom>
+        </p:spPr>
+        <p:style>
+          <a:lnRef idx="2">
+            <a:schemeClr val="accent1">
+              <a:shade val="50000"/>
+            </a:schemeClr>
+          </a:lnRef>
+          <a:fillRef idx="1">
+            <a:schemeClr val="accent1"/>
+          </a:fillRef>
+          <a:effectRef idx="0">
+            <a:schemeClr val="accent1"/>
+          </a:effectRef>
+          <a:fontRef idx="minor">
+            <a:schemeClr val="lt1"/>
+          </a:fontRef>
+        </p:style>
+        <p:txBody>
+          <a:bodyPr rtlCol="0" anchor="ctr"/>
+          <a:lstStyle/>
+          <a:p>
+            <a:pPr algn="ctr"/>
+            <a:r>
+              <a:rPr lang="zh-CN" altLang="en-US" dirty="0" smtClean="0"/>
+              <a:t>策略报告</a:t>
+            </a:r>
+            <a:endParaRPr lang="zh-CN" altLang="en-US" dirty="0"/>
+          </a:p>
+        </p:txBody>
+      </p:sp>
+      <p:cxnSp>
+        <p:nvCxnSpPr>
+          <p:cNvPr id="12" name="直接箭头连接符 11"/>
+          <p:cNvCxnSpPr>
+            <a:endCxn id="10" idx="2"/>
+          </p:cNvCxnSpPr>
+          <p:nvPr/>
+        </p:nvCxnSpPr>
+        <p:spPr>
+          <a:xfrm>
+            <a:off x="6084168" y="2708920"/>
+            <a:ext cx="864096" cy="0"/>
+          </a:xfrm>
+          <a:prstGeom prst="straightConnector1">
+            <a:avLst/>
+          </a:prstGeom>
+          <a:ln>
+            <a:tailEnd type="arrow"/>
+          </a:ln>
+        </p:spPr>
+        <p:style>
+          <a:lnRef idx="1">
+            <a:schemeClr val="accent1"/>
+          </a:lnRef>
+          <a:fillRef idx="0">
+            <a:schemeClr val="accent1"/>
+          </a:fillRef>
+          <a:effectRef idx="0">
+            <a:schemeClr val="accent1"/>
+          </a:effectRef>
+          <a:fontRef idx="minor">
+            <a:schemeClr val="tx1"/>
+          </a:fontRef>
+        </p:style>
+      </p:cxnSp>
     </p:spTree>
   </p:cSld>
   <p:clrMapOvr>
@@ -4911,11 +4978,7 @@
           <a:p>
             <a:r>
               <a:rPr lang="zh-CN" altLang="en-US" dirty="0" smtClean="0"/>
-              <a:t>信</a:t>
-            </a:r>
-            <a:r>
-              <a:rPr lang="zh-CN" altLang="en-US" dirty="0" smtClean="0"/>
-              <a:t>号统计</a:t>
+              <a:t>信号统计</a:t>
             </a:r>
             <a:endParaRPr lang="zh-CN" altLang="en-US" dirty="0"/>
           </a:p>
@@ -5022,11 +5085,7 @@
             <a:pPr algn="ctr"/>
             <a:r>
               <a:rPr lang="zh-CN" altLang="en-US" dirty="0" smtClean="0"/>
-              <a:t>双</a:t>
-            </a:r>
-            <a:r>
-              <a:rPr lang="zh-CN" altLang="en-US" dirty="0" smtClean="0"/>
-              <a:t>信号统计</a:t>
+              <a:t>双信号统计</a:t>
             </a:r>
             <a:endParaRPr lang="zh-CN" altLang="en-US" dirty="0"/>
           </a:p>
@@ -5125,15 +5184,7 @@
                   <a:schemeClr val="tx1"/>
                 </a:solidFill>
               </a:rPr>
-              <a:t>大盘</a:t>
-            </a:r>
-            <a:r>
-              <a:rPr lang="zh-CN" altLang="en-US" dirty="0" smtClean="0">
-                <a:solidFill>
-                  <a:schemeClr val="tx1"/>
-                </a:solidFill>
-              </a:rPr>
-              <a:t>统计</a:t>
+              <a:t>大盘统计</a:t>
             </a:r>
             <a:endParaRPr lang="zh-CN" altLang="en-US" dirty="0">
               <a:solidFill>
@@ -5204,15 +5255,7 @@
                   <a:schemeClr val="tx1"/>
                 </a:solidFill>
               </a:rPr>
-              <a:t>线</a:t>
-            </a:r>
-            <a:r>
-              <a:rPr lang="zh-CN" altLang="en-US" dirty="0" smtClean="0">
-                <a:solidFill>
-                  <a:schemeClr val="tx1"/>
-                </a:solidFill>
-              </a:rPr>
-              <a:t>统计</a:t>
+              <a:t>线统计</a:t>
             </a:r>
             <a:endParaRPr lang="zh-CN" altLang="en-US" dirty="0">
               <a:solidFill>
@@ -5267,23 +5310,7 @@
                   <a:schemeClr val="tx1"/>
                 </a:solidFill>
               </a:rPr>
-              <a:t>升降整趋</a:t>
-            </a:r>
-            <a:r>
-              <a:rPr lang="zh-CN" altLang="en-US" dirty="0" smtClean="0">
-                <a:solidFill>
-                  <a:schemeClr val="tx1"/>
-                </a:solidFill>
-              </a:rPr>
-              <a:t>势</a:t>
-            </a:r>
-            <a:r>
-              <a:rPr lang="zh-CN" altLang="en-US" dirty="0" smtClean="0">
-                <a:solidFill>
-                  <a:schemeClr val="tx1"/>
-                </a:solidFill>
-              </a:rPr>
-              <a:t>统计</a:t>
+              <a:t>升降整趋势统计</a:t>
             </a:r>
             <a:endParaRPr lang="zh-CN" altLang="en-US" dirty="0">
               <a:solidFill>
@@ -5701,11 +5728,7 @@
             </a:pPr>
             <a:r>
               <a:rPr lang="zh-CN" altLang="en-US" dirty="0" smtClean="0"/>
-              <a:t>最</a:t>
-            </a:r>
-            <a:r>
-              <a:rPr lang="zh-CN" altLang="en-US" dirty="0" smtClean="0"/>
-              <a:t>近</a:t>
+              <a:t>最近</a:t>
             </a:r>
             <a:r>
               <a:rPr lang="en-US" altLang="zh-CN" dirty="0" smtClean="0"/>
@@ -5738,11 +5761,7 @@
             </a:pPr>
             <a:r>
               <a:rPr lang="zh-CN" altLang="en-US" dirty="0" smtClean="0"/>
-              <a:t>不</a:t>
-            </a:r>
-            <a:r>
-              <a:rPr lang="zh-CN" altLang="en-US" dirty="0" smtClean="0"/>
-              <a:t>同的策略可以对比，以便筛选</a:t>
+              <a:t>不同的策略可以对比，以便筛选</a:t>
             </a:r>
             <a:endParaRPr lang="zh-CN" altLang="en-US" dirty="0"/>
           </a:p>
@@ -5853,7 +5872,19 @@
             <a:pPr algn="ctr"/>
             <a:r>
               <a:rPr lang="zh-CN" altLang="en-US" dirty="0" smtClean="0"/>
-              <a:t>买卖和报告</a:t>
+              <a:t>买卖和报</a:t>
+            </a:r>
+            <a:r>
+              <a:rPr lang="zh-CN" altLang="en-US" dirty="0" smtClean="0"/>
+              <a:t>告</a:t>
+            </a:r>
+            <a:r>
+              <a:rPr lang="en-US" altLang="zh-CN" dirty="0" smtClean="0"/>
+              <a:t>,</a:t>
+            </a:r>
+            <a:r>
+              <a:rPr lang="zh-CN" altLang="en-US" dirty="0" smtClean="0"/>
+              <a:t>策略模拟，验证，实盘</a:t>
             </a:r>
             <a:endParaRPr lang="zh-CN" altLang="en-US" dirty="0"/>
           </a:p>
@@ -5949,11 +5980,7 @@
           <a:p>
             <a:r>
               <a:rPr lang="zh-CN" altLang="en-US" dirty="0" smtClean="0"/>
-              <a:t>分</a:t>
-            </a:r>
-            <a:r>
-              <a:rPr lang="zh-CN" altLang="en-US" dirty="0" smtClean="0"/>
-              <a:t>析对象</a:t>
+              <a:t>分析对象</a:t>
             </a:r>
             <a:endParaRPr lang="zh-CN" altLang="en-US" dirty="0"/>
           </a:p>
@@ -6107,11 +6134,7 @@
             <a:pPr algn="ctr"/>
             <a:r>
               <a:rPr lang="zh-CN" altLang="en-US" dirty="0" smtClean="0"/>
-              <a:t>全部</a:t>
-            </a:r>
-            <a:r>
-              <a:rPr lang="zh-CN" altLang="en-US" dirty="0" smtClean="0"/>
-              <a:t>股</a:t>
+              <a:t>全部股</a:t>
             </a:r>
             <a:endParaRPr lang="zh-CN" altLang="en-US" dirty="0"/>
           </a:p>
@@ -6475,11 +6498,7 @@
             <a:pPr algn="ctr"/>
             <a:r>
               <a:rPr lang="zh-CN" altLang="en-US" dirty="0" smtClean="0"/>
-              <a:t>多股</a:t>
-            </a:r>
-            <a:r>
-              <a:rPr lang="zh-CN" altLang="en-US" dirty="0" smtClean="0"/>
-              <a:t>分析</a:t>
+              <a:t>多股分析</a:t>
             </a:r>
             <a:r>
               <a:rPr lang="en-US" altLang="zh-CN" dirty="0" smtClean="0"/>
@@ -6682,11 +6701,7 @@
             <a:pPr algn="ctr"/>
             <a:r>
               <a:rPr lang="zh-CN" altLang="en-US" dirty="0" smtClean="0"/>
-              <a:t>更新</a:t>
-            </a:r>
-            <a:r>
-              <a:rPr lang="zh-CN" altLang="en-US" dirty="0" smtClean="0"/>
-              <a:t>统计文件</a:t>
+              <a:t>更新统计文件</a:t>
             </a:r>
             <a:endParaRPr lang="zh-CN" altLang="en-US" dirty="0"/>
           </a:p>

</xml_diff>

<commit_message>
update on 2014/04/01 - 6:54:03.93
</commit_message>
<xml_diff>
--- a/version1.0/document/股票分析系统.pptx
+++ b/version1.0/document/股票分析系统.pptx
@@ -290,7 +290,7 @@
             <a:fld id="{530820CF-B880-4189-942D-D702A7CBA730}" type="datetimeFigureOut">
               <a:rPr lang="zh-CN" altLang="en-US" smtClean="0"/>
               <a:pPr/>
-              <a:t>2014/3/31</a:t>
+              <a:t>2014/3/31 Monday</a:t>
             </a:fld>
             <a:endParaRPr lang="zh-CN" altLang="en-US"/>
           </a:p>
@@ -457,7 +457,7 @@
             <a:fld id="{530820CF-B880-4189-942D-D702A7CBA730}" type="datetimeFigureOut">
               <a:rPr lang="zh-CN" altLang="en-US" smtClean="0"/>
               <a:pPr/>
-              <a:t>2014/3/31</a:t>
+              <a:t>2014/3/31 Monday</a:t>
             </a:fld>
             <a:endParaRPr lang="zh-CN" altLang="en-US"/>
           </a:p>
@@ -634,7 +634,7 @@
             <a:fld id="{530820CF-B880-4189-942D-D702A7CBA730}" type="datetimeFigureOut">
               <a:rPr lang="zh-CN" altLang="en-US" smtClean="0"/>
               <a:pPr/>
-              <a:t>2014/3/31</a:t>
+              <a:t>2014/3/31 Monday</a:t>
             </a:fld>
             <a:endParaRPr lang="zh-CN" altLang="en-US"/>
           </a:p>
@@ -801,7 +801,7 @@
             <a:fld id="{530820CF-B880-4189-942D-D702A7CBA730}" type="datetimeFigureOut">
               <a:rPr lang="zh-CN" altLang="en-US" smtClean="0"/>
               <a:pPr/>
-              <a:t>2014/3/31</a:t>
+              <a:t>2014/3/31 Monday</a:t>
             </a:fld>
             <a:endParaRPr lang="zh-CN" altLang="en-US"/>
           </a:p>
@@ -1045,7 +1045,7 @@
             <a:fld id="{530820CF-B880-4189-942D-D702A7CBA730}" type="datetimeFigureOut">
               <a:rPr lang="zh-CN" altLang="en-US" smtClean="0"/>
               <a:pPr/>
-              <a:t>2014/3/31</a:t>
+              <a:t>2014/3/31 Monday</a:t>
             </a:fld>
             <a:endParaRPr lang="zh-CN" altLang="en-US"/>
           </a:p>
@@ -1311,7 +1311,7 @@
             <a:fld id="{530820CF-B880-4189-942D-D702A7CBA730}" type="datetimeFigureOut">
               <a:rPr lang="zh-CN" altLang="en-US" smtClean="0"/>
               <a:pPr/>
-              <a:t>2014/3/31</a:t>
+              <a:t>2014/3/31 Monday</a:t>
             </a:fld>
             <a:endParaRPr lang="zh-CN" altLang="en-US"/>
           </a:p>
@@ -1691,7 +1691,7 @@
             <a:fld id="{530820CF-B880-4189-942D-D702A7CBA730}" type="datetimeFigureOut">
               <a:rPr lang="zh-CN" altLang="en-US" smtClean="0"/>
               <a:pPr/>
-              <a:t>2014/3/31</a:t>
+              <a:t>2014/3/31 Monday</a:t>
             </a:fld>
             <a:endParaRPr lang="zh-CN" altLang="en-US"/>
           </a:p>
@@ -1843,7 +1843,7 @@
             <a:fld id="{530820CF-B880-4189-942D-D702A7CBA730}" type="datetimeFigureOut">
               <a:rPr lang="zh-CN" altLang="en-US" smtClean="0"/>
               <a:pPr/>
-              <a:t>2014/3/31</a:t>
+              <a:t>2014/3/31 Monday</a:t>
             </a:fld>
             <a:endParaRPr lang="zh-CN" altLang="en-US"/>
           </a:p>
@@ -1935,7 +1935,7 @@
             <a:fld id="{530820CF-B880-4189-942D-D702A7CBA730}" type="datetimeFigureOut">
               <a:rPr lang="zh-CN" altLang="en-US" smtClean="0"/>
               <a:pPr/>
-              <a:t>2014/3/31</a:t>
+              <a:t>2014/3/31 Monday</a:t>
             </a:fld>
             <a:endParaRPr lang="zh-CN" altLang="en-US"/>
           </a:p>
@@ -2198,7 +2198,7 @@
             <a:fld id="{530820CF-B880-4189-942D-D702A7CBA730}" type="datetimeFigureOut">
               <a:rPr lang="zh-CN" altLang="en-US" smtClean="0"/>
               <a:pPr/>
-              <a:t>2014/3/31</a:t>
+              <a:t>2014/3/31 Monday</a:t>
             </a:fld>
             <a:endParaRPr lang="zh-CN" altLang="en-US"/>
           </a:p>
@@ -2488,7 +2488,7 @@
             <a:fld id="{530820CF-B880-4189-942D-D702A7CBA730}" type="datetimeFigureOut">
               <a:rPr lang="zh-CN" altLang="en-US" smtClean="0"/>
               <a:pPr/>
-              <a:t>2014/3/31</a:t>
+              <a:t>2014/3/31 Monday</a:t>
             </a:fld>
             <a:endParaRPr lang="zh-CN" altLang="en-US"/>
           </a:p>
@@ -3261,7 +3261,7 @@
             <a:fld id="{530820CF-B880-4189-942D-D702A7CBA730}" type="datetimeFigureOut">
               <a:rPr lang="zh-CN" altLang="en-US" smtClean="0"/>
               <a:pPr/>
-              <a:t>2014/3/31</a:t>
+              <a:t>2014/3/31 Monday</a:t>
             </a:fld>
             <a:endParaRPr lang="zh-CN" altLang="en-US"/>
           </a:p>
@@ -5872,11 +5872,7 @@
             <a:pPr algn="ctr"/>
             <a:r>
               <a:rPr lang="zh-CN" altLang="en-US" dirty="0" smtClean="0"/>
-              <a:t>买卖和报</a:t>
-            </a:r>
-            <a:r>
-              <a:rPr lang="zh-CN" altLang="en-US" dirty="0" smtClean="0"/>
-              <a:t>告</a:t>
+              <a:t>买卖和报告</a:t>
             </a:r>
             <a:r>
               <a:rPr lang="en-US" altLang="zh-CN" dirty="0" smtClean="0"/>
@@ -5884,7 +5880,23 @@
             </a:r>
             <a:r>
               <a:rPr lang="zh-CN" altLang="en-US" dirty="0" smtClean="0"/>
-              <a:t>策略模拟，验证，实盘</a:t>
+              <a:t>策略模拟，验证，实</a:t>
+            </a:r>
+            <a:r>
+              <a:rPr lang="zh-CN" altLang="en-US" dirty="0" smtClean="0"/>
+              <a:t>盘</a:t>
+            </a:r>
+            <a:r>
+              <a:rPr lang="en-US" altLang="zh-CN" dirty="0" smtClean="0"/>
+              <a:t>-</a:t>
+            </a:r>
+            <a:r>
+              <a:rPr lang="en-US" altLang="zh-CN" dirty="0" err="1" smtClean="0"/>
+              <a:t>Qian</a:t>
+            </a:r>
+            <a:r>
+              <a:rPr lang="en-US" altLang="zh-CN" dirty="0" smtClean="0"/>
+              <a:t> Solution</a:t>
             </a:r>
             <a:endParaRPr lang="zh-CN" altLang="en-US" dirty="0"/>
           </a:p>
@@ -5932,7 +5944,7 @@
             </a:r>
             <a:r>
               <a:rPr lang="en-US" altLang="zh-CN" dirty="0" smtClean="0"/>
-              <a:t>API</a:t>
+              <a:t>API-Kun Solution</a:t>
             </a:r>
             <a:endParaRPr lang="zh-CN" altLang="en-US" dirty="0"/>
           </a:p>

</xml_diff>